<commit_message>
Add a Result file
</commit_message>
<xml_diff>
--- a/结果整理/Mesh2Plot结果.pptx
+++ b/结果整理/Mesh2Plot结果.pptx
@@ -262,7 +262,7 @@
           <a:p>
             <a:fld id="{6BD6B6D1-3DB2-4446-92DC-C8BD7BECB2D1}" type="datetimeFigureOut">
               <a:rPr lang="zh-CN" altLang="en-US" smtClean="0"/>
-              <a:t>2023/3/31</a:t>
+              <a:t>2023/4/4</a:t>
             </a:fld>
             <a:endParaRPr lang="zh-CN" altLang="en-US"/>
           </a:p>
@@ -460,7 +460,7 @@
           <a:p>
             <a:fld id="{6BD6B6D1-3DB2-4446-92DC-C8BD7BECB2D1}" type="datetimeFigureOut">
               <a:rPr lang="zh-CN" altLang="en-US" smtClean="0"/>
-              <a:t>2023/3/31</a:t>
+              <a:t>2023/4/4</a:t>
             </a:fld>
             <a:endParaRPr lang="zh-CN" altLang="en-US"/>
           </a:p>
@@ -668,7 +668,7 @@
           <a:p>
             <a:fld id="{6BD6B6D1-3DB2-4446-92DC-C8BD7BECB2D1}" type="datetimeFigureOut">
               <a:rPr lang="zh-CN" altLang="en-US" smtClean="0"/>
-              <a:t>2023/3/31</a:t>
+              <a:t>2023/4/4</a:t>
             </a:fld>
             <a:endParaRPr lang="zh-CN" altLang="en-US"/>
           </a:p>
@@ -866,7 +866,7 @@
           <a:p>
             <a:fld id="{6BD6B6D1-3DB2-4446-92DC-C8BD7BECB2D1}" type="datetimeFigureOut">
               <a:rPr lang="zh-CN" altLang="en-US" smtClean="0"/>
-              <a:t>2023/3/31</a:t>
+              <a:t>2023/4/4</a:t>
             </a:fld>
             <a:endParaRPr lang="zh-CN" altLang="en-US"/>
           </a:p>
@@ -1141,7 +1141,7 @@
           <a:p>
             <a:fld id="{6BD6B6D1-3DB2-4446-92DC-C8BD7BECB2D1}" type="datetimeFigureOut">
               <a:rPr lang="zh-CN" altLang="en-US" smtClean="0"/>
-              <a:t>2023/3/31</a:t>
+              <a:t>2023/4/4</a:t>
             </a:fld>
             <a:endParaRPr lang="zh-CN" altLang="en-US"/>
           </a:p>
@@ -1406,7 +1406,7 @@
           <a:p>
             <a:fld id="{6BD6B6D1-3DB2-4446-92DC-C8BD7BECB2D1}" type="datetimeFigureOut">
               <a:rPr lang="zh-CN" altLang="en-US" smtClean="0"/>
-              <a:t>2023/3/31</a:t>
+              <a:t>2023/4/4</a:t>
             </a:fld>
             <a:endParaRPr lang="zh-CN" altLang="en-US"/>
           </a:p>
@@ -1818,7 +1818,7 @@
           <a:p>
             <a:fld id="{6BD6B6D1-3DB2-4446-92DC-C8BD7BECB2D1}" type="datetimeFigureOut">
               <a:rPr lang="zh-CN" altLang="en-US" smtClean="0"/>
-              <a:t>2023/3/31</a:t>
+              <a:t>2023/4/4</a:t>
             </a:fld>
             <a:endParaRPr lang="zh-CN" altLang="en-US"/>
           </a:p>
@@ -1959,7 +1959,7 @@
           <a:p>
             <a:fld id="{6BD6B6D1-3DB2-4446-92DC-C8BD7BECB2D1}" type="datetimeFigureOut">
               <a:rPr lang="zh-CN" altLang="en-US" smtClean="0"/>
-              <a:t>2023/3/31</a:t>
+              <a:t>2023/4/4</a:t>
             </a:fld>
             <a:endParaRPr lang="zh-CN" altLang="en-US"/>
           </a:p>
@@ -2072,7 +2072,7 @@
           <a:p>
             <a:fld id="{6BD6B6D1-3DB2-4446-92DC-C8BD7BECB2D1}" type="datetimeFigureOut">
               <a:rPr lang="zh-CN" altLang="en-US" smtClean="0"/>
-              <a:t>2023/3/31</a:t>
+              <a:t>2023/4/4</a:t>
             </a:fld>
             <a:endParaRPr lang="zh-CN" altLang="en-US"/>
           </a:p>
@@ -2383,7 +2383,7 @@
           <a:p>
             <a:fld id="{6BD6B6D1-3DB2-4446-92DC-C8BD7BECB2D1}" type="datetimeFigureOut">
               <a:rPr lang="zh-CN" altLang="en-US" smtClean="0"/>
-              <a:t>2023/3/31</a:t>
+              <a:t>2023/4/4</a:t>
             </a:fld>
             <a:endParaRPr lang="zh-CN" altLang="en-US"/>
           </a:p>
@@ -2671,7 +2671,7 @@
           <a:p>
             <a:fld id="{6BD6B6D1-3DB2-4446-92DC-C8BD7BECB2D1}" type="datetimeFigureOut">
               <a:rPr lang="zh-CN" altLang="en-US" smtClean="0"/>
-              <a:t>2023/3/31</a:t>
+              <a:t>2023/4/4</a:t>
             </a:fld>
             <a:endParaRPr lang="zh-CN" altLang="en-US"/>
           </a:p>
@@ -2912,7 +2912,7 @@
           <a:p>
             <a:fld id="{6BD6B6D1-3DB2-4446-92DC-C8BD7BECB2D1}" type="datetimeFigureOut">
               <a:rPr lang="zh-CN" altLang="en-US" smtClean="0"/>
-              <a:t>2023/3/31</a:t>
+              <a:t>2023/4/4</a:t>
             </a:fld>
             <a:endParaRPr lang="zh-CN" altLang="en-US"/>
           </a:p>
@@ -3541,10 +3541,35 @@
       </p:grpSpPr>
       <p:sp>
         <p:nvSpPr>
-          <p:cNvPr id="2" name="标题 1">
-            <a:extLst>
-              <a:ext uri="{FF2B5EF4-FFF2-40B4-BE49-F238E27FC236}">
-                <a16:creationId xmlns:a16="http://schemas.microsoft.com/office/drawing/2014/main" id="{A9CF1BCA-6DC1-46DA-92D6-1EA173F7DA2D}"/>
+          <p:cNvPr id="3" name="内容占位符 2">
+            <a:extLst>
+              <a:ext uri="{FF2B5EF4-FFF2-40B4-BE49-F238E27FC236}">
+                <a16:creationId xmlns:a16="http://schemas.microsoft.com/office/drawing/2014/main" id="{EFBF995E-F89B-4326-97CE-1F5DDDFD2D67}"/>
+              </a:ext>
+            </a:extLst>
+          </p:cNvPr>
+          <p:cNvSpPr>
+            <a:spLocks noGrp="1"/>
+          </p:cNvSpPr>
+          <p:nvPr>
+            <p:ph idx="1"/>
+          </p:nvPr>
+        </p:nvSpPr>
+        <p:spPr/>
+        <p:txBody>
+          <a:bodyPr/>
+          <a:lstStyle/>
+          <a:p>
+            <a:endParaRPr lang="zh-CN" altLang="en-US"/>
+          </a:p>
+        </p:txBody>
+      </p:sp>
+      <p:sp>
+        <p:nvSpPr>
+          <p:cNvPr id="5" name="标题 4">
+            <a:extLst>
+              <a:ext uri="{FF2B5EF4-FFF2-40B4-BE49-F238E27FC236}">
+                <a16:creationId xmlns:a16="http://schemas.microsoft.com/office/drawing/2014/main" id="{E207B2C2-6C3A-45FF-858B-9754081B6A60}"/>
               </a:ext>
             </a:extLst>
           </p:cNvPr>
@@ -3560,36 +3585,313 @@
           <a:bodyPr/>
           <a:lstStyle/>
           <a:p>
-            <a:r>
-              <a:rPr lang="en-US" altLang="zh-CN"/>
-              <a:t>1</a:t>
-            </a:r>
             <a:endParaRPr lang="zh-CN" altLang="en-US"/>
           </a:p>
         </p:txBody>
       </p:sp>
-      <p:sp>
-        <p:nvSpPr>
-          <p:cNvPr id="3" name="内容占位符 2">
-            <a:extLst>
-              <a:ext uri="{FF2B5EF4-FFF2-40B4-BE49-F238E27FC236}">
-                <a16:creationId xmlns:a16="http://schemas.microsoft.com/office/drawing/2014/main" id="{EFBF995E-F89B-4326-97CE-1F5DDDFD2D67}"/>
-              </a:ext>
-            </a:extLst>
-          </p:cNvPr>
-          <p:cNvSpPr>
-            <a:spLocks noGrp="1"/>
-          </p:cNvSpPr>
-          <p:nvPr>
-            <p:ph idx="1"/>
-          </p:nvPr>
-        </p:nvSpPr>
-        <p:spPr/>
-        <p:txBody>
-          <a:bodyPr/>
-          <a:lstStyle/>
-          <a:p>
-            <a:endParaRPr lang="zh-CN" altLang="en-US"/>
+      <p:pic>
+        <p:nvPicPr>
+          <p:cNvPr id="6" name="图片 5">
+            <a:extLst>
+              <a:ext uri="{FF2B5EF4-FFF2-40B4-BE49-F238E27FC236}">
+                <a16:creationId xmlns:a16="http://schemas.microsoft.com/office/drawing/2014/main" id="{51ACFD61-C539-4670-BA8A-CA6A3440281E}"/>
+              </a:ext>
+            </a:extLst>
+          </p:cNvPr>
+          <p:cNvPicPr>
+            <a:picLocks noChangeAspect="1"/>
+          </p:cNvPicPr>
+          <p:nvPr/>
+        </p:nvPicPr>
+        <p:blipFill rotWithShape="1">
+          <a:blip r:embed="rId2"/>
+          <a:srcRect l="4431" t="17211" r="7176" b="3292"/>
+          <a:stretch/>
+        </p:blipFill>
+        <p:spPr>
+          <a:xfrm>
+            <a:off x="68580" y="2164080"/>
+            <a:ext cx="4866640" cy="3876954"/>
+          </a:xfrm>
+          <a:prstGeom prst="rect">
+            <a:avLst/>
+          </a:prstGeom>
+        </p:spPr>
+      </p:pic>
+      <p:pic>
+        <p:nvPicPr>
+          <p:cNvPr id="7" name="图片 6">
+            <a:extLst>
+              <a:ext uri="{FF2B5EF4-FFF2-40B4-BE49-F238E27FC236}">
+                <a16:creationId xmlns:a16="http://schemas.microsoft.com/office/drawing/2014/main" id="{1CA8C925-2901-4685-BD05-4DC2468E9A85}"/>
+              </a:ext>
+            </a:extLst>
+          </p:cNvPr>
+          <p:cNvPicPr>
+            <a:picLocks noChangeAspect="1"/>
+          </p:cNvPicPr>
+          <p:nvPr/>
+        </p:nvPicPr>
+        <p:blipFill rotWithShape="1">
+          <a:blip r:embed="rId3"/>
+          <a:srcRect l="8201" t="31067" r="1999" b="22533"/>
+          <a:stretch/>
+        </p:blipFill>
+        <p:spPr>
+          <a:xfrm>
+            <a:off x="5280660" y="2712720"/>
+            <a:ext cx="6842760" cy="2651760"/>
+          </a:xfrm>
+          <a:prstGeom prst="rect">
+            <a:avLst/>
+          </a:prstGeom>
+        </p:spPr>
+      </p:pic>
+      <p:sp>
+        <p:nvSpPr>
+          <p:cNvPr id="8" name="标题 1">
+            <a:extLst>
+              <a:ext uri="{FF2B5EF4-FFF2-40B4-BE49-F238E27FC236}">
+                <a16:creationId xmlns:a16="http://schemas.microsoft.com/office/drawing/2014/main" id="{1034A139-F20B-4493-A1E4-34CAAD892B45}"/>
+              </a:ext>
+            </a:extLst>
+          </p:cNvPr>
+          <p:cNvSpPr txBox="1">
+            <a:spLocks/>
+          </p:cNvSpPr>
+          <p:nvPr/>
+        </p:nvSpPr>
+        <p:spPr>
+          <a:xfrm>
+            <a:off x="2049780" y="951865"/>
+            <a:ext cx="2225040" cy="1325563"/>
+          </a:xfrm>
+          <a:prstGeom prst="rect">
+            <a:avLst/>
+          </a:prstGeom>
+        </p:spPr>
+        <p:txBody>
+          <a:bodyPr vert="horz" lIns="91440" tIns="45720" rIns="91440" bIns="45720" rtlCol="0" anchor="ctr">
+            <a:normAutofit/>
+          </a:bodyPr>
+          <a:lstStyle>
+            <a:lvl1pPr algn="l" defTabSz="914400" rtl="0" eaLnBrk="1" latinLnBrk="0" hangingPunct="1">
+              <a:lnSpc>
+                <a:spcPct val="90000"/>
+              </a:lnSpc>
+              <a:spcBef>
+                <a:spcPct val="0"/>
+              </a:spcBef>
+              <a:buNone/>
+              <a:defRPr sz="4400" kern="1200">
+                <a:solidFill>
+                  <a:schemeClr val="tx1"/>
+                </a:solidFill>
+                <a:latin typeface="+mj-lt"/>
+                <a:ea typeface="+mj-ea"/>
+                <a:cs typeface="+mj-cs"/>
+              </a:defRPr>
+            </a:lvl1pPr>
+          </a:lstStyle>
+          <a:p>
+            <a:r>
+              <a:rPr lang="en-US" altLang="zh-CN" b="1">
+                <a:latin typeface="+mn-lt"/>
+              </a:rPr>
+              <a:t>2D</a:t>
+            </a:r>
+            <a:endParaRPr lang="zh-CN" altLang="en-US" b="1" dirty="0">
+              <a:latin typeface="+mn-lt"/>
+            </a:endParaRPr>
+          </a:p>
+        </p:txBody>
+      </p:sp>
+      <p:sp>
+        <p:nvSpPr>
+          <p:cNvPr id="9" name="标题 1">
+            <a:extLst>
+              <a:ext uri="{FF2B5EF4-FFF2-40B4-BE49-F238E27FC236}">
+                <a16:creationId xmlns:a16="http://schemas.microsoft.com/office/drawing/2014/main" id="{9F724131-1E0C-4CB9-A5AE-98973D5E404A}"/>
+              </a:ext>
+            </a:extLst>
+          </p:cNvPr>
+          <p:cNvSpPr txBox="1">
+            <a:spLocks/>
+          </p:cNvSpPr>
+          <p:nvPr/>
+        </p:nvSpPr>
+        <p:spPr>
+          <a:xfrm>
+            <a:off x="8427720" y="1195705"/>
+            <a:ext cx="2225040" cy="1325563"/>
+          </a:xfrm>
+          <a:prstGeom prst="rect">
+            <a:avLst/>
+          </a:prstGeom>
+        </p:spPr>
+        <p:txBody>
+          <a:bodyPr vert="horz" lIns="91440" tIns="45720" rIns="91440" bIns="45720" rtlCol="0" anchor="ctr">
+            <a:normAutofit/>
+          </a:bodyPr>
+          <a:lstStyle>
+            <a:lvl1pPr algn="l" defTabSz="914400" rtl="0" eaLnBrk="1" latinLnBrk="0" hangingPunct="1">
+              <a:lnSpc>
+                <a:spcPct val="90000"/>
+              </a:lnSpc>
+              <a:spcBef>
+                <a:spcPct val="0"/>
+              </a:spcBef>
+              <a:buNone/>
+              <a:defRPr sz="4400" kern="1200">
+                <a:solidFill>
+                  <a:schemeClr val="tx1"/>
+                </a:solidFill>
+                <a:latin typeface="+mj-lt"/>
+                <a:ea typeface="+mj-ea"/>
+                <a:cs typeface="+mj-cs"/>
+              </a:defRPr>
+            </a:lvl1pPr>
+          </a:lstStyle>
+          <a:p>
+            <a:r>
+              <a:rPr lang="en-US" altLang="zh-CN" b="1" dirty="0">
+                <a:latin typeface="+mn-lt"/>
+              </a:rPr>
+              <a:t>3D</a:t>
+            </a:r>
+            <a:endParaRPr lang="zh-CN" altLang="en-US" b="1" dirty="0">
+              <a:latin typeface="+mn-lt"/>
+            </a:endParaRPr>
+          </a:p>
+        </p:txBody>
+      </p:sp>
+      <p:sp>
+        <p:nvSpPr>
+          <p:cNvPr id="10" name="标题 1">
+            <a:extLst>
+              <a:ext uri="{FF2B5EF4-FFF2-40B4-BE49-F238E27FC236}">
+                <a16:creationId xmlns:a16="http://schemas.microsoft.com/office/drawing/2014/main" id="{51019091-15FB-4F8E-A530-9A141E37393C}"/>
+              </a:ext>
+            </a:extLst>
+          </p:cNvPr>
+          <p:cNvSpPr txBox="1">
+            <a:spLocks/>
+          </p:cNvSpPr>
+          <p:nvPr/>
+        </p:nvSpPr>
+        <p:spPr>
+          <a:xfrm>
+            <a:off x="381000" y="167957"/>
+            <a:ext cx="11673840" cy="1325563"/>
+          </a:xfrm>
+          <a:prstGeom prst="rect">
+            <a:avLst/>
+          </a:prstGeom>
+        </p:spPr>
+        <p:txBody>
+          <a:bodyPr vert="horz" lIns="91440" tIns="45720" rIns="91440" bIns="45720" rtlCol="0" anchor="ctr">
+            <a:normAutofit/>
+          </a:bodyPr>
+          <a:lstStyle>
+            <a:lvl1pPr algn="l" defTabSz="914400" rtl="0" eaLnBrk="1" latinLnBrk="0" hangingPunct="1">
+              <a:lnSpc>
+                <a:spcPct val="90000"/>
+              </a:lnSpc>
+              <a:spcBef>
+                <a:spcPct val="0"/>
+              </a:spcBef>
+              <a:buNone/>
+              <a:defRPr sz="4400" kern="1200">
+                <a:solidFill>
+                  <a:schemeClr val="tx1"/>
+                </a:solidFill>
+                <a:latin typeface="+mj-lt"/>
+                <a:ea typeface="+mj-ea"/>
+                <a:cs typeface="+mj-cs"/>
+              </a:defRPr>
+            </a:lvl1pPr>
+          </a:lstStyle>
+          <a:p>
+            <a:r>
+              <a:rPr lang="zh-CN" altLang="en-US" sz="3600" b="1" dirty="0">
+                <a:latin typeface="+mn-lt"/>
+              </a:rPr>
+              <a:t>保持相对位置不变，计算变形前后的相对位置系数用于验证</a:t>
+            </a:r>
+          </a:p>
+        </p:txBody>
+      </p:sp>
+      <p:sp>
+        <p:nvSpPr>
+          <p:cNvPr id="11" name="标题 1">
+            <a:extLst>
+              <a:ext uri="{FF2B5EF4-FFF2-40B4-BE49-F238E27FC236}">
+                <a16:creationId xmlns:a16="http://schemas.microsoft.com/office/drawing/2014/main" id="{09E37975-FF98-4F23-B855-3A032D8FE489}"/>
+              </a:ext>
+            </a:extLst>
+          </p:cNvPr>
+          <p:cNvSpPr txBox="1">
+            <a:spLocks/>
+          </p:cNvSpPr>
+          <p:nvPr/>
+        </p:nvSpPr>
+        <p:spPr>
+          <a:xfrm>
+            <a:off x="175260" y="5807075"/>
+            <a:ext cx="11673840" cy="1325563"/>
+          </a:xfrm>
+          <a:prstGeom prst="rect">
+            <a:avLst/>
+          </a:prstGeom>
+        </p:spPr>
+        <p:txBody>
+          <a:bodyPr vert="horz" lIns="91440" tIns="45720" rIns="91440" bIns="45720" rtlCol="0" anchor="ctr">
+            <a:normAutofit/>
+          </a:bodyPr>
+          <a:lstStyle>
+            <a:lvl1pPr algn="l" defTabSz="914400" rtl="0" eaLnBrk="1" latinLnBrk="0" hangingPunct="1">
+              <a:lnSpc>
+                <a:spcPct val="90000"/>
+              </a:lnSpc>
+              <a:spcBef>
+                <a:spcPct val="0"/>
+              </a:spcBef>
+              <a:buNone/>
+              <a:defRPr sz="4400" kern="1200">
+                <a:solidFill>
+                  <a:schemeClr val="tx1"/>
+                </a:solidFill>
+                <a:latin typeface="+mj-lt"/>
+                <a:ea typeface="+mj-ea"/>
+                <a:cs typeface="+mj-cs"/>
+              </a:defRPr>
+            </a:lvl1pPr>
+          </a:lstStyle>
+          <a:p>
+            <a:r>
+              <a:rPr lang="en-US" altLang="zh-CN" sz="2400" b="1" dirty="0">
+                <a:latin typeface="+mn-lt"/>
+              </a:rPr>
+              <a:t>COMSOL</a:t>
+            </a:r>
+            <a:r>
+              <a:rPr lang="zh-CN" altLang="en-US" sz="2400" b="1" dirty="0">
+                <a:latin typeface="+mn-lt"/>
+              </a:rPr>
+              <a:t>导出的</a:t>
+            </a:r>
+            <a:r>
+              <a:rPr lang="en-US" altLang="zh-CN" sz="2400" b="1" dirty="0" err="1">
+                <a:latin typeface="+mn-lt"/>
+              </a:rPr>
+              <a:t>stl</a:t>
+            </a:r>
+            <a:r>
+              <a:rPr lang="zh-CN" altLang="en-US" sz="2400" b="1" dirty="0">
+                <a:latin typeface="+mn-lt"/>
+              </a:rPr>
+              <a:t>文件只有网格坐标，如何构建四面体？剖分函数输出的数据结构？</a:t>
+            </a:r>
           </a:p>
         </p:txBody>
       </p:sp>

</xml_diff>

<commit_message>
Add new Result slide
</commit_message>
<xml_diff>
--- a/结果整理/Mesh2Plot结果.pptx
+++ b/结果整理/Mesh2Plot结果.pptx
@@ -9,6 +9,7 @@
     <p:sldId id="258" r:id="rId3"/>
     <p:sldId id="257" r:id="rId4"/>
     <p:sldId id="259" r:id="rId5"/>
+    <p:sldId id="260" r:id="rId6"/>
   </p:sldIdLst>
   <p:sldSz cx="12192000" cy="6858000"/>
   <p:notesSz cx="6858000" cy="9144000"/>
@@ -262,7 +263,7 @@
           <a:p>
             <a:fld id="{6BD6B6D1-3DB2-4446-92DC-C8BD7BECB2D1}" type="datetimeFigureOut">
               <a:rPr lang="zh-CN" altLang="en-US" smtClean="0"/>
-              <a:t>2023/4/4</a:t>
+              <a:t>2023/4/10</a:t>
             </a:fld>
             <a:endParaRPr lang="zh-CN" altLang="en-US"/>
           </a:p>
@@ -460,7 +461,7 @@
           <a:p>
             <a:fld id="{6BD6B6D1-3DB2-4446-92DC-C8BD7BECB2D1}" type="datetimeFigureOut">
               <a:rPr lang="zh-CN" altLang="en-US" smtClean="0"/>
-              <a:t>2023/4/4</a:t>
+              <a:t>2023/4/10</a:t>
             </a:fld>
             <a:endParaRPr lang="zh-CN" altLang="en-US"/>
           </a:p>
@@ -668,7 +669,7 @@
           <a:p>
             <a:fld id="{6BD6B6D1-3DB2-4446-92DC-C8BD7BECB2D1}" type="datetimeFigureOut">
               <a:rPr lang="zh-CN" altLang="en-US" smtClean="0"/>
-              <a:t>2023/4/4</a:t>
+              <a:t>2023/4/10</a:t>
             </a:fld>
             <a:endParaRPr lang="zh-CN" altLang="en-US"/>
           </a:p>
@@ -866,7 +867,7 @@
           <a:p>
             <a:fld id="{6BD6B6D1-3DB2-4446-92DC-C8BD7BECB2D1}" type="datetimeFigureOut">
               <a:rPr lang="zh-CN" altLang="en-US" smtClean="0"/>
-              <a:t>2023/4/4</a:t>
+              <a:t>2023/4/10</a:t>
             </a:fld>
             <a:endParaRPr lang="zh-CN" altLang="en-US"/>
           </a:p>
@@ -1141,7 +1142,7 @@
           <a:p>
             <a:fld id="{6BD6B6D1-3DB2-4446-92DC-C8BD7BECB2D1}" type="datetimeFigureOut">
               <a:rPr lang="zh-CN" altLang="en-US" smtClean="0"/>
-              <a:t>2023/4/4</a:t>
+              <a:t>2023/4/10</a:t>
             </a:fld>
             <a:endParaRPr lang="zh-CN" altLang="en-US"/>
           </a:p>
@@ -1406,7 +1407,7 @@
           <a:p>
             <a:fld id="{6BD6B6D1-3DB2-4446-92DC-C8BD7BECB2D1}" type="datetimeFigureOut">
               <a:rPr lang="zh-CN" altLang="en-US" smtClean="0"/>
-              <a:t>2023/4/4</a:t>
+              <a:t>2023/4/10</a:t>
             </a:fld>
             <a:endParaRPr lang="zh-CN" altLang="en-US"/>
           </a:p>
@@ -1818,7 +1819,7 @@
           <a:p>
             <a:fld id="{6BD6B6D1-3DB2-4446-92DC-C8BD7BECB2D1}" type="datetimeFigureOut">
               <a:rPr lang="zh-CN" altLang="en-US" smtClean="0"/>
-              <a:t>2023/4/4</a:t>
+              <a:t>2023/4/10</a:t>
             </a:fld>
             <a:endParaRPr lang="zh-CN" altLang="en-US"/>
           </a:p>
@@ -1959,7 +1960,7 @@
           <a:p>
             <a:fld id="{6BD6B6D1-3DB2-4446-92DC-C8BD7BECB2D1}" type="datetimeFigureOut">
               <a:rPr lang="zh-CN" altLang="en-US" smtClean="0"/>
-              <a:t>2023/4/4</a:t>
+              <a:t>2023/4/10</a:t>
             </a:fld>
             <a:endParaRPr lang="zh-CN" altLang="en-US"/>
           </a:p>
@@ -2072,7 +2073,7 @@
           <a:p>
             <a:fld id="{6BD6B6D1-3DB2-4446-92DC-C8BD7BECB2D1}" type="datetimeFigureOut">
               <a:rPr lang="zh-CN" altLang="en-US" smtClean="0"/>
-              <a:t>2023/4/4</a:t>
+              <a:t>2023/4/10</a:t>
             </a:fld>
             <a:endParaRPr lang="zh-CN" altLang="en-US"/>
           </a:p>
@@ -2383,7 +2384,7 @@
           <a:p>
             <a:fld id="{6BD6B6D1-3DB2-4446-92DC-C8BD7BECB2D1}" type="datetimeFigureOut">
               <a:rPr lang="zh-CN" altLang="en-US" smtClean="0"/>
-              <a:t>2023/4/4</a:t>
+              <a:t>2023/4/10</a:t>
             </a:fld>
             <a:endParaRPr lang="zh-CN" altLang="en-US"/>
           </a:p>
@@ -2671,7 +2672,7 @@
           <a:p>
             <a:fld id="{6BD6B6D1-3DB2-4446-92DC-C8BD7BECB2D1}" type="datetimeFigureOut">
               <a:rPr lang="zh-CN" altLang="en-US" smtClean="0"/>
-              <a:t>2023/4/4</a:t>
+              <a:t>2023/4/10</a:t>
             </a:fld>
             <a:endParaRPr lang="zh-CN" altLang="en-US"/>
           </a:p>
@@ -2912,7 +2913,7 @@
           <a:p>
             <a:fld id="{6BD6B6D1-3DB2-4446-92DC-C8BD7BECB2D1}" type="datetimeFigureOut">
               <a:rPr lang="zh-CN" altLang="en-US" smtClean="0"/>
-              <a:t>2023/4/4</a:t>
+              <a:t>2023/4/10</a:t>
             </a:fld>
             <a:endParaRPr lang="zh-CN" altLang="en-US"/>
           </a:p>
@@ -3908,6 +3909,72 @@
 </p:sld>
 </file>
 
+<file path=ppt/slides/slide5.xml><?xml version="1.0" encoding="utf-8"?>
+<p:sld xmlns:a="http://schemas.openxmlformats.org/drawingml/2006/main" xmlns:r="http://schemas.openxmlformats.org/officeDocument/2006/relationships" xmlns:p="http://schemas.openxmlformats.org/presentationml/2006/main">
+  <p:cSld>
+    <p:spTree>
+      <p:nvGrpSpPr>
+        <p:cNvPr id="1" name=""/>
+        <p:cNvGrpSpPr/>
+        <p:nvPr/>
+      </p:nvGrpSpPr>
+      <p:grpSpPr>
+        <a:xfrm>
+          <a:off x="0" y="0"/>
+          <a:ext cx="0" cy="0"/>
+          <a:chOff x="0" y="0"/>
+          <a:chExt cx="0" cy="0"/>
+        </a:xfrm>
+      </p:grpSpPr>
+      <p:pic>
+        <p:nvPicPr>
+          <p:cNvPr id="5" name="图片 4">
+            <a:extLst>
+              <a:ext uri="{FF2B5EF4-FFF2-40B4-BE49-F238E27FC236}">
+                <a16:creationId xmlns:a16="http://schemas.microsoft.com/office/drawing/2014/main" id="{6ABDB3BB-385C-47BD-AD5E-17AFD5488982}"/>
+              </a:ext>
+            </a:extLst>
+          </p:cNvPr>
+          <p:cNvPicPr>
+            <a:picLocks noChangeAspect="1"/>
+          </p:cNvPicPr>
+          <p:nvPr/>
+        </p:nvPicPr>
+        <p:blipFill>
+          <a:blip r:embed="rId2">
+            <a:extLst>
+              <a:ext uri="{28A0092B-C50C-407E-A947-70E740481C1C}">
+                <a14:useLocalDpi xmlns:a14="http://schemas.microsoft.com/office/drawing/2010/main" val="0"/>
+              </a:ext>
+            </a:extLst>
+          </a:blip>
+          <a:stretch>
+            <a:fillRect/>
+          </a:stretch>
+        </p:blipFill>
+        <p:spPr>
+          <a:xfrm>
+            <a:off x="1736521" y="-179493"/>
+            <a:ext cx="8166969" cy="7037493"/>
+          </a:xfrm>
+          <a:prstGeom prst="rect">
+            <a:avLst/>
+          </a:prstGeom>
+        </p:spPr>
+      </p:pic>
+    </p:spTree>
+    <p:extLst>
+      <p:ext uri="{BB962C8B-B14F-4D97-AF65-F5344CB8AC3E}">
+        <p14:creationId xmlns:p14="http://schemas.microsoft.com/office/powerpoint/2010/main" val="3303678875"/>
+      </p:ext>
+    </p:extLst>
+  </p:cSld>
+  <p:clrMapOvr>
+    <a:masterClrMapping/>
+  </p:clrMapOvr>
+</p:sld>
+</file>
+
 <file path=ppt/theme/theme1.xml><?xml version="1.0" encoding="utf-8"?>
 <a:theme xmlns:a="http://schemas.openxmlformats.org/drawingml/2006/main" name="Office 主题​​">
   <a:themeElements>

</xml_diff>